<commit_message>
updates to HTTP Server
</commit_message>
<xml_diff>
--- a/Presentations/CS - HTTP.pptx
+++ b/Presentations/CS - HTTP.pptx
@@ -212,7 +212,7 @@
           <a:p>
             <a:fld id="{FAF957FC-5175-49AC-8D2B-2F056FFFC1DD}" type="datetimeFigureOut">
               <a:rPr lang="en-US" smtClean="0"/>
-              <a:t>2/3/2018</a:t>
+              <a:t>2/5/2018</a:t>
             </a:fld>
             <a:endParaRPr lang="en-US"/>
           </a:p>
@@ -662,7 +662,7 @@
             <a:fld id="{1D8BD707-D9CF-40AE-B4C6-C98DA3205C09}" type="datetimeFigureOut">
               <a:rPr lang="en-US" smtClean="0"/>
               <a:pPr/>
-              <a:t>2/3/2018</a:t>
+              <a:t>2/5/2018</a:t>
             </a:fld>
             <a:endParaRPr lang="en-US"/>
           </a:p>
@@ -829,7 +829,7 @@
             <a:fld id="{1D8BD707-D9CF-40AE-B4C6-C98DA3205C09}" type="datetimeFigureOut">
               <a:rPr lang="en-US" smtClean="0"/>
               <a:pPr/>
-              <a:t>2/3/2018</a:t>
+              <a:t>2/5/2018</a:t>
             </a:fld>
             <a:endParaRPr lang="en-US"/>
           </a:p>
@@ -1006,7 +1006,7 @@
             <a:fld id="{1D8BD707-D9CF-40AE-B4C6-C98DA3205C09}" type="datetimeFigureOut">
               <a:rPr lang="en-US" smtClean="0"/>
               <a:pPr/>
-              <a:t>2/3/2018</a:t>
+              <a:t>2/5/2018</a:t>
             </a:fld>
             <a:endParaRPr lang="en-US"/>
           </a:p>
@@ -1173,7 +1173,7 @@
             <a:fld id="{1D8BD707-D9CF-40AE-B4C6-C98DA3205C09}" type="datetimeFigureOut">
               <a:rPr lang="en-US" smtClean="0"/>
               <a:pPr/>
-              <a:t>2/3/2018</a:t>
+              <a:t>2/5/2018</a:t>
             </a:fld>
             <a:endParaRPr lang="en-US"/>
           </a:p>
@@ -1416,7 +1416,7 @@
             <a:fld id="{1D8BD707-D9CF-40AE-B4C6-C98DA3205C09}" type="datetimeFigureOut">
               <a:rPr lang="en-US" smtClean="0"/>
               <a:pPr/>
-              <a:t>2/3/2018</a:t>
+              <a:t>2/5/2018</a:t>
             </a:fld>
             <a:endParaRPr lang="en-US"/>
           </a:p>
@@ -1701,7 +1701,7 @@
             <a:fld id="{1D8BD707-D9CF-40AE-B4C6-C98DA3205C09}" type="datetimeFigureOut">
               <a:rPr lang="en-US" smtClean="0"/>
               <a:pPr/>
-              <a:t>2/3/2018</a:t>
+              <a:t>2/5/2018</a:t>
             </a:fld>
             <a:endParaRPr lang="en-US"/>
           </a:p>
@@ -2120,7 +2120,7 @@
             <a:fld id="{1D8BD707-D9CF-40AE-B4C6-C98DA3205C09}" type="datetimeFigureOut">
               <a:rPr lang="en-US" smtClean="0"/>
               <a:pPr/>
-              <a:t>2/3/2018</a:t>
+              <a:t>2/5/2018</a:t>
             </a:fld>
             <a:endParaRPr lang="en-US"/>
           </a:p>
@@ -2235,7 +2235,7 @@
             <a:fld id="{1D8BD707-D9CF-40AE-B4C6-C98DA3205C09}" type="datetimeFigureOut">
               <a:rPr lang="en-US" smtClean="0"/>
               <a:pPr/>
-              <a:t>2/3/2018</a:t>
+              <a:t>2/5/2018</a:t>
             </a:fld>
             <a:endParaRPr lang="en-US"/>
           </a:p>
@@ -2327,7 +2327,7 @@
             <a:fld id="{1D8BD707-D9CF-40AE-B4C6-C98DA3205C09}" type="datetimeFigureOut">
               <a:rPr lang="en-US" smtClean="0"/>
               <a:pPr/>
-              <a:t>2/3/2018</a:t>
+              <a:t>2/5/2018</a:t>
             </a:fld>
             <a:endParaRPr lang="en-US"/>
           </a:p>
@@ -2601,7 +2601,7 @@
             <a:fld id="{1D8BD707-D9CF-40AE-B4C6-C98DA3205C09}" type="datetimeFigureOut">
               <a:rPr lang="en-US" smtClean="0"/>
               <a:pPr/>
-              <a:t>2/3/2018</a:t>
+              <a:t>2/5/2018</a:t>
             </a:fld>
             <a:endParaRPr lang="en-US"/>
           </a:p>
@@ -2851,7 +2851,7 @@
             <a:fld id="{1D8BD707-D9CF-40AE-B4C6-C98DA3205C09}" type="datetimeFigureOut">
               <a:rPr lang="en-US" smtClean="0"/>
               <a:pPr/>
-              <a:t>2/3/2018</a:t>
+              <a:t>2/5/2018</a:t>
             </a:fld>
             <a:endParaRPr lang="en-US"/>
           </a:p>
@@ -3061,7 +3061,7 @@
             <a:fld id="{1D8BD707-D9CF-40AE-B4C6-C98DA3205C09}" type="datetimeFigureOut">
               <a:rPr lang="en-US" smtClean="0"/>
               <a:pPr/>
-              <a:t>2/3/2018</a:t>
+              <a:t>2/5/2018</a:t>
             </a:fld>
             <a:endParaRPr lang="en-US"/>
           </a:p>
@@ -7294,11 +7294,15 @@
             </a:r>
             <a:r>
               <a:rPr lang="en-US" sz="1600" b="1" dirty="0" err="1" smtClean="0"/>
-              <a:t>uril</a:t>
-            </a:r>
-            <a:r>
-              <a:rPr lang="en-US" sz="1600" b="1" dirty="0" smtClean="0"/>
-              <a:t>          = words[ 1 ]</a:t>
+              <a:t>uri</a:t>
+            </a:r>
+            <a:r>
+              <a:rPr lang="en-US" sz="1600" b="1" dirty="0" smtClean="0"/>
+              <a:t>           </a:t>
+            </a:r>
+            <a:r>
+              <a:rPr lang="en-US" sz="1600" b="1" dirty="0" smtClean="0"/>
+              <a:t>= words[ 1 ]</a:t>
             </a:r>
           </a:p>
           <a:p>
@@ -7616,7 +7620,15 @@
             </a:r>
             <a:r>
               <a:rPr lang="en-US" sz="1600" b="1" dirty="0" smtClean="0"/>
-              <a:t>) != 2</a:t>
+              <a:t>) </a:t>
+            </a:r>
+            <a:r>
+              <a:rPr lang="en-US" sz="1600" b="1" dirty="0" smtClean="0"/>
+              <a:t>&lt; </a:t>
+            </a:r>
+            <a:r>
+              <a:rPr lang="en-US" sz="1600" b="1" dirty="0" smtClean="0"/>
+              <a:t>2</a:t>
             </a:r>
           </a:p>
           <a:p>
@@ -7680,8 +7692,13 @@
             </a:r>
             <a:r>
               <a:rPr lang="en-US" sz="1600" b="1" dirty="0" smtClean="0"/>
-              <a:t>[ 1 ]</a:t>
-            </a:r>
+              <a:t>[ </a:t>
+            </a:r>
+            <a:r>
+              <a:rPr lang="en-US" sz="1600" b="1" dirty="0" smtClean="0"/>
+              <a:t>1 ]</a:t>
+            </a:r>
+            <a:endParaRPr lang="en-US" sz="1600" b="1" dirty="0" smtClean="0"/>
           </a:p>
           <a:p>
             <a:endParaRPr lang="en-US" sz="1600" b="1" dirty="0"/>
@@ -8527,8 +8544,13 @@
             </a:r>
             <a:r>
               <a:rPr lang="en-US" sz="1600" b="1" dirty="0" smtClean="0"/>
-              <a:t>	if line equals CRLF</a:t>
-            </a:r>
+              <a:t>	</a:t>
+            </a:r>
+            <a:r>
+              <a:rPr lang="en-US" sz="1600" b="1" dirty="0" smtClean="0"/>
+              <a:t>if line is empty</a:t>
+            </a:r>
+            <a:endParaRPr lang="en-US" sz="1600" b="1" dirty="0" smtClean="0"/>
           </a:p>
           <a:p>
             <a:r>
@@ -10731,7 +10753,15 @@
             </a:r>
             <a:r>
               <a:rPr lang="en-US" sz="1600" b="1" dirty="0" smtClean="0"/>
-              <a:t>( method, resource, </a:t>
+              <a:t>( method, </a:t>
+            </a:r>
+            <a:r>
+              <a:rPr lang="en-US" sz="1600" b="1" dirty="0" err="1" smtClean="0"/>
+              <a:t>uri</a:t>
+            </a:r>
+            <a:r>
+              <a:rPr lang="en-US" sz="1600" b="1" dirty="0" smtClean="0"/>
+              <a:t>, </a:t>
             </a:r>
             <a:r>
               <a:rPr lang="en-US" sz="1600" b="1" dirty="0" err="1" smtClean="0"/>
@@ -10917,7 +10947,40 @@
                   </a:schemeClr>
                 </a:solidFill>
               </a:rPr>
-              <a:t>( method, resource, message )</a:t>
+              <a:t>( method, </a:t>
+            </a:r>
+            <a:r>
+              <a:rPr lang="en-US" sz="1600" b="1" dirty="0" err="1" smtClean="0">
+                <a:solidFill>
+                  <a:schemeClr val="tx1">
+                    <a:lumMod val="95000"/>
+                    <a:lumOff val="5000"/>
+                  </a:schemeClr>
+                </a:solidFill>
+              </a:rPr>
+              <a:t>uri</a:t>
+            </a:r>
+            <a:r>
+              <a:rPr lang="en-US" sz="1600" b="1" dirty="0" smtClean="0">
+                <a:solidFill>
+                  <a:schemeClr val="tx1">
+                    <a:lumMod val="95000"/>
+                    <a:lumOff val="5000"/>
+                  </a:schemeClr>
+                </a:solidFill>
+              </a:rPr>
+              <a:t>, </a:t>
+            </a:r>
+            <a:r>
+              <a:rPr lang="en-US" sz="1600" b="1" dirty="0" smtClean="0">
+                <a:solidFill>
+                  <a:schemeClr val="tx1">
+                    <a:lumMod val="95000"/>
+                    <a:lumOff val="5000"/>
+                  </a:schemeClr>
+                </a:solidFill>
+              </a:rPr>
+              <a:t>message )</a:t>
             </a:r>
           </a:p>
           <a:p>
@@ -11817,7 +11880,40 @@
                   </a:schemeClr>
                 </a:solidFill>
               </a:rPr>
-              <a:t>		method, resource, message = </a:t>
+              <a:t>		method, </a:t>
+            </a:r>
+            <a:r>
+              <a:rPr lang="en-US" sz="1600" b="1" dirty="0" err="1" smtClean="0">
+                <a:solidFill>
+                  <a:schemeClr val="tx1">
+                    <a:lumMod val="95000"/>
+                    <a:lumOff val="5000"/>
+                  </a:schemeClr>
+                </a:solidFill>
+              </a:rPr>
+              <a:t>uri</a:t>
+            </a:r>
+            <a:r>
+              <a:rPr lang="en-US" sz="1600" b="1" dirty="0" smtClean="0">
+                <a:solidFill>
+                  <a:schemeClr val="tx1">
+                    <a:lumMod val="95000"/>
+                    <a:lumOff val="5000"/>
+                  </a:schemeClr>
+                </a:solidFill>
+              </a:rPr>
+              <a:t>, </a:t>
+            </a:r>
+            <a:r>
+              <a:rPr lang="en-US" sz="1600" b="1" dirty="0" smtClean="0">
+                <a:solidFill>
+                  <a:schemeClr val="tx1">
+                    <a:lumMod val="95000"/>
+                    <a:lumOff val="5000"/>
+                  </a:schemeClr>
+                </a:solidFill>
+              </a:rPr>
+              <a:t>message = </a:t>
             </a:r>
             <a:r>
               <a:rPr lang="en-US" sz="1600" b="1" dirty="0" err="1" smtClean="0">
@@ -11870,8 +11966,29 @@
                   <a:srgbClr val="00B050"/>
                 </a:solidFill>
               </a:rPr>
-              <a:t># do something with the request</a:t>
-            </a:r>
+              <a:t># do something with the </a:t>
+            </a:r>
+            <a:r>
+              <a:rPr lang="en-US" sz="1600" b="1" dirty="0" smtClean="0">
+                <a:solidFill>
+                  <a:srgbClr val="00B050"/>
+                </a:solidFill>
+              </a:rPr>
+              <a:t>request (sets status, reason </a:t>
+            </a:r>
+            <a:r>
+              <a:rPr lang="en-US" sz="1600" b="1" smtClean="0">
+                <a:solidFill>
+                  <a:srgbClr val="00B050"/>
+                </a:solidFill>
+              </a:rPr>
+              <a:t>and resource)</a:t>
+            </a:r>
+            <a:endParaRPr lang="en-US" sz="1600" b="1" dirty="0" smtClean="0">
+              <a:solidFill>
+                <a:srgbClr val="00B050"/>
+              </a:solidFill>
+            </a:endParaRPr>
           </a:p>
           <a:p>
             <a:endParaRPr lang="en-US" sz="1600" b="1" dirty="0">
@@ -14250,11 +14367,7 @@
           <a:p>
             <a:r>
               <a:rPr lang="en-US" sz="1400" b="1" dirty="0" smtClean="0"/>
-              <a:t>Web </a:t>
-            </a:r>
-            <a:r>
-              <a:rPr lang="en-US" sz="1400" b="1" dirty="0" smtClean="0"/>
-              <a:t>Server</a:t>
+              <a:t>Web Server</a:t>
             </a:r>
             <a:endParaRPr lang="en-US" sz="1400" b="1" dirty="0"/>
           </a:p>
@@ -17590,7 +17703,15 @@
             </a:r>
             <a:r>
               <a:rPr lang="en-US" sz="1600" b="1" dirty="0" smtClean="0"/>
-              <a:t>	header = key + “:” + value + CRLF</a:t>
+              <a:t>	header </a:t>
+            </a:r>
+            <a:r>
+              <a:rPr lang="en-US" sz="1600" b="1" dirty="0" smtClean="0"/>
+              <a:t>+= </a:t>
+            </a:r>
+            <a:r>
+              <a:rPr lang="en-US" sz="1600" b="1" dirty="0" smtClean="0"/>
+              <a:t>key + “:” + value + CRLF</a:t>
             </a:r>
             <a:br>
               <a:rPr lang="en-US" sz="1600" b="1" dirty="0" smtClean="0"/>

</xml_diff>

<commit_message>
fix missing headers in response packet
</commit_message>
<xml_diff>
--- a/Presentations/CS - HTTP.pptx
+++ b/Presentations/CS - HTTP.pptx
@@ -212,7 +212,7 @@
           <a:p>
             <a:fld id="{FAF957FC-5175-49AC-8D2B-2F056FFFC1DD}" type="datetimeFigureOut">
               <a:rPr lang="en-US" smtClean="0"/>
-              <a:t>2/5/2018</a:t>
+              <a:t>2/6/2018</a:t>
             </a:fld>
             <a:endParaRPr lang="en-US"/>
           </a:p>
@@ -480,6 +480,94 @@
 </p:notesMaster>
 </file>
 
+<file path=ppt/notesSlides/notesSlide1.xml><?xml version="1.0" encoding="utf-8"?>
+<p:notes xmlns:a="http://schemas.openxmlformats.org/drawingml/2006/main" xmlns:r="http://schemas.openxmlformats.org/officeDocument/2006/relationships" xmlns:p="http://schemas.openxmlformats.org/presentationml/2006/main">
+  <p:cSld>
+    <p:spTree>
+      <p:nvGrpSpPr>
+        <p:cNvPr id="1" name=""/>
+        <p:cNvGrpSpPr/>
+        <p:nvPr/>
+      </p:nvGrpSpPr>
+      <p:grpSpPr>
+        <a:xfrm>
+          <a:off x="0" y="0"/>
+          <a:ext cx="0" cy="0"/>
+          <a:chOff x="0" y="0"/>
+          <a:chExt cx="0" cy="0"/>
+        </a:xfrm>
+      </p:grpSpPr>
+      <p:sp>
+        <p:nvSpPr>
+          <p:cNvPr id="2" name="Slide Image Placeholder 1"/>
+          <p:cNvSpPr>
+            <a:spLocks noGrp="1" noRot="1" noChangeAspect="1"/>
+          </p:cNvSpPr>
+          <p:nvPr>
+            <p:ph type="sldImg"/>
+          </p:nvPr>
+        </p:nvSpPr>
+        <p:spPr/>
+      </p:sp>
+      <p:sp>
+        <p:nvSpPr>
+          <p:cNvPr id="3" name="Notes Placeholder 2"/>
+          <p:cNvSpPr>
+            <a:spLocks noGrp="1"/>
+          </p:cNvSpPr>
+          <p:nvPr>
+            <p:ph type="body" idx="1"/>
+          </p:nvPr>
+        </p:nvSpPr>
+        <p:spPr/>
+        <p:txBody>
+          <a:bodyPr/>
+          <a:lstStyle/>
+          <a:p>
+            <a:r>
+              <a:rPr lang="en-US" dirty="0" smtClean="0"/>
+              <a:t>Needs update to show headers</a:t>
+            </a:r>
+            <a:endParaRPr lang="en-US" dirty="0"/>
+          </a:p>
+        </p:txBody>
+      </p:sp>
+      <p:sp>
+        <p:nvSpPr>
+          <p:cNvPr id="4" name="Slide Number Placeholder 3"/>
+          <p:cNvSpPr>
+            <a:spLocks noGrp="1"/>
+          </p:cNvSpPr>
+          <p:nvPr>
+            <p:ph type="sldNum" sz="quarter" idx="10"/>
+          </p:nvPr>
+        </p:nvSpPr>
+        <p:spPr/>
+        <p:txBody>
+          <a:bodyPr/>
+          <a:lstStyle/>
+          <a:p>
+            <a:fld id="{F06D5892-0430-4AF2-93AC-99DFD0427A02}" type="slidenum">
+              <a:rPr lang="en-US" smtClean="0"/>
+              <a:t>12</a:t>
+            </a:fld>
+            <a:endParaRPr lang="en-US"/>
+          </a:p>
+        </p:txBody>
+      </p:sp>
+    </p:spTree>
+    <p:extLst>
+      <p:ext uri="{BB962C8B-B14F-4D97-AF65-F5344CB8AC3E}">
+        <p14:creationId xmlns:p14="http://schemas.microsoft.com/office/powerpoint/2010/main" val="3909931792"/>
+      </p:ext>
+    </p:extLst>
+  </p:cSld>
+  <p:clrMapOvr>
+    <a:masterClrMapping/>
+  </p:clrMapOvr>
+</p:notes>
+</file>
+
 <file path=ppt/slideLayouts/slideLayout1.xml><?xml version="1.0" encoding="utf-8"?>
 <p:sldLayout xmlns:a="http://schemas.openxmlformats.org/drawingml/2006/main" xmlns:r="http://schemas.openxmlformats.org/officeDocument/2006/relationships" xmlns:p="http://schemas.openxmlformats.org/presentationml/2006/main" type="title" preserve="1">
   <p:cSld name="Title Slide">
@@ -662,7 +750,7 @@
             <a:fld id="{1D8BD707-D9CF-40AE-B4C6-C98DA3205C09}" type="datetimeFigureOut">
               <a:rPr lang="en-US" smtClean="0"/>
               <a:pPr/>
-              <a:t>2/5/2018</a:t>
+              <a:t>2/6/2018</a:t>
             </a:fld>
             <a:endParaRPr lang="en-US"/>
           </a:p>
@@ -829,7 +917,7 @@
             <a:fld id="{1D8BD707-D9CF-40AE-B4C6-C98DA3205C09}" type="datetimeFigureOut">
               <a:rPr lang="en-US" smtClean="0"/>
               <a:pPr/>
-              <a:t>2/5/2018</a:t>
+              <a:t>2/6/2018</a:t>
             </a:fld>
             <a:endParaRPr lang="en-US"/>
           </a:p>
@@ -1006,7 +1094,7 @@
             <a:fld id="{1D8BD707-D9CF-40AE-B4C6-C98DA3205C09}" type="datetimeFigureOut">
               <a:rPr lang="en-US" smtClean="0"/>
               <a:pPr/>
-              <a:t>2/5/2018</a:t>
+              <a:t>2/6/2018</a:t>
             </a:fld>
             <a:endParaRPr lang="en-US"/>
           </a:p>
@@ -1173,7 +1261,7 @@
             <a:fld id="{1D8BD707-D9CF-40AE-B4C6-C98DA3205C09}" type="datetimeFigureOut">
               <a:rPr lang="en-US" smtClean="0"/>
               <a:pPr/>
-              <a:t>2/5/2018</a:t>
+              <a:t>2/6/2018</a:t>
             </a:fld>
             <a:endParaRPr lang="en-US"/>
           </a:p>
@@ -1416,7 +1504,7 @@
             <a:fld id="{1D8BD707-D9CF-40AE-B4C6-C98DA3205C09}" type="datetimeFigureOut">
               <a:rPr lang="en-US" smtClean="0"/>
               <a:pPr/>
-              <a:t>2/5/2018</a:t>
+              <a:t>2/6/2018</a:t>
             </a:fld>
             <a:endParaRPr lang="en-US"/>
           </a:p>
@@ -1701,7 +1789,7 @@
             <a:fld id="{1D8BD707-D9CF-40AE-B4C6-C98DA3205C09}" type="datetimeFigureOut">
               <a:rPr lang="en-US" smtClean="0"/>
               <a:pPr/>
-              <a:t>2/5/2018</a:t>
+              <a:t>2/6/2018</a:t>
             </a:fld>
             <a:endParaRPr lang="en-US"/>
           </a:p>
@@ -2120,7 +2208,7 @@
             <a:fld id="{1D8BD707-D9CF-40AE-B4C6-C98DA3205C09}" type="datetimeFigureOut">
               <a:rPr lang="en-US" smtClean="0"/>
               <a:pPr/>
-              <a:t>2/5/2018</a:t>
+              <a:t>2/6/2018</a:t>
             </a:fld>
             <a:endParaRPr lang="en-US"/>
           </a:p>
@@ -2235,7 +2323,7 @@
             <a:fld id="{1D8BD707-D9CF-40AE-B4C6-C98DA3205C09}" type="datetimeFigureOut">
               <a:rPr lang="en-US" smtClean="0"/>
               <a:pPr/>
-              <a:t>2/5/2018</a:t>
+              <a:t>2/6/2018</a:t>
             </a:fld>
             <a:endParaRPr lang="en-US"/>
           </a:p>
@@ -2327,7 +2415,7 @@
             <a:fld id="{1D8BD707-D9CF-40AE-B4C6-C98DA3205C09}" type="datetimeFigureOut">
               <a:rPr lang="en-US" smtClean="0"/>
               <a:pPr/>
-              <a:t>2/5/2018</a:t>
+              <a:t>2/6/2018</a:t>
             </a:fld>
             <a:endParaRPr lang="en-US"/>
           </a:p>
@@ -2601,7 +2689,7 @@
             <a:fld id="{1D8BD707-D9CF-40AE-B4C6-C98DA3205C09}" type="datetimeFigureOut">
               <a:rPr lang="en-US" smtClean="0"/>
               <a:pPr/>
-              <a:t>2/5/2018</a:t>
+              <a:t>2/6/2018</a:t>
             </a:fld>
             <a:endParaRPr lang="en-US"/>
           </a:p>
@@ -2851,7 +2939,7 @@
             <a:fld id="{1D8BD707-D9CF-40AE-B4C6-C98DA3205C09}" type="datetimeFigureOut">
               <a:rPr lang="en-US" smtClean="0"/>
               <a:pPr/>
-              <a:t>2/5/2018</a:t>
+              <a:t>2/6/2018</a:t>
             </a:fld>
             <a:endParaRPr lang="en-US"/>
           </a:p>
@@ -3061,7 +3149,7 @@
             <a:fld id="{1D8BD707-D9CF-40AE-B4C6-C98DA3205C09}" type="datetimeFigureOut">
               <a:rPr lang="en-US" smtClean="0"/>
               <a:pPr/>
-              <a:t>2/5/2018</a:t>
+              <a:t>2/6/2018</a:t>
             </a:fld>
             <a:endParaRPr lang="en-US"/>
           </a:p>
@@ -4920,42 +5008,6 @@
           </a:p>
         </p:txBody>
       </p:sp>
-      <p:cxnSp>
-        <p:nvCxnSpPr>
-          <p:cNvPr id="31" name="Curved Connector 30"/>
-          <p:cNvCxnSpPr/>
-          <p:nvPr/>
-        </p:nvCxnSpPr>
-        <p:spPr>
-          <a:xfrm rot="10800000" flipV="1">
-            <a:off x="5389756" y="2843592"/>
-            <a:ext cx="533400" cy="276205"/>
-          </a:xfrm>
-          <a:prstGeom prst="curvedConnector3">
-            <a:avLst/>
-          </a:prstGeom>
-          <a:ln>
-            <a:solidFill>
-              <a:srgbClr val="00B050"/>
-            </a:solidFill>
-            <a:tailEnd type="arrow"/>
-          </a:ln>
-        </p:spPr>
-        <p:style>
-          <a:lnRef idx="1">
-            <a:schemeClr val="accent1"/>
-          </a:lnRef>
-          <a:fillRef idx="0">
-            <a:schemeClr val="accent1"/>
-          </a:fillRef>
-          <a:effectRef idx="0">
-            <a:schemeClr val="accent1"/>
-          </a:effectRef>
-          <a:fontRef idx="minor">
-            <a:schemeClr val="tx1"/>
-          </a:fontRef>
-        </p:style>
-      </p:cxnSp>
       <p:sp>
         <p:nvSpPr>
           <p:cNvPr id="33" name="TextBox 32"/>
@@ -5269,6 +5321,182 @@
           </a:p>
         </p:txBody>
       </p:sp>
+      <p:sp>
+        <p:nvSpPr>
+          <p:cNvPr id="23" name="Rectangle 22"/>
+          <p:cNvSpPr/>
+          <p:nvPr/>
+        </p:nvSpPr>
+        <p:spPr>
+          <a:xfrm>
+            <a:off x="3637156" y="3349787"/>
+            <a:ext cx="1676400" cy="1122791"/>
+          </a:xfrm>
+          <a:prstGeom prst="rect">
+            <a:avLst/>
+          </a:prstGeom>
+          <a:solidFill>
+            <a:schemeClr val="accent5">
+              <a:lumMod val="75000"/>
+            </a:schemeClr>
+          </a:solidFill>
+          <a:ln>
+            <a:solidFill>
+              <a:schemeClr val="accent5">
+                <a:lumMod val="75000"/>
+              </a:schemeClr>
+            </a:solidFill>
+          </a:ln>
+        </p:spPr>
+        <p:style>
+          <a:lnRef idx="2">
+            <a:schemeClr val="accent1">
+              <a:shade val="50000"/>
+            </a:schemeClr>
+          </a:lnRef>
+          <a:fillRef idx="1">
+            <a:schemeClr val="accent1"/>
+          </a:fillRef>
+          <a:effectRef idx="0">
+            <a:schemeClr val="accent1"/>
+          </a:effectRef>
+          <a:fontRef idx="minor">
+            <a:schemeClr val="lt1"/>
+          </a:fontRef>
+        </p:style>
+        <p:txBody>
+          <a:bodyPr rtlCol="0" anchor="ctr"/>
+          <a:lstStyle/>
+          <a:p>
+            <a:pPr algn="ctr"/>
+            <a:r>
+              <a:rPr lang="en-US" dirty="0" smtClean="0"/>
+              <a:t>HEADERS</a:t>
+            </a:r>
+            <a:endParaRPr lang="en-US" dirty="0"/>
+          </a:p>
+        </p:txBody>
+      </p:sp>
+      <p:sp>
+        <p:nvSpPr>
+          <p:cNvPr id="24" name="TextBox 23"/>
+          <p:cNvSpPr txBox="1"/>
+          <p:nvPr/>
+        </p:nvSpPr>
+        <p:spPr>
+          <a:xfrm>
+            <a:off x="5850673" y="3496081"/>
+            <a:ext cx="2297937" cy="276999"/>
+          </a:xfrm>
+          <a:prstGeom prst="rect">
+            <a:avLst/>
+          </a:prstGeom>
+          <a:noFill/>
+        </p:spPr>
+        <p:txBody>
+          <a:bodyPr wrap="none" rtlCol="0">
+            <a:spAutoFit/>
+          </a:bodyPr>
+          <a:lstStyle/>
+          <a:p>
+            <a:r>
+              <a:rPr lang="en-US" sz="1200" b="1" u="sng" dirty="0" smtClean="0">
+                <a:solidFill>
+                  <a:schemeClr val="accent1">
+                    <a:lumMod val="75000"/>
+                  </a:schemeClr>
+                </a:solidFill>
+              </a:rPr>
+              <a:t>Zero </a:t>
+            </a:r>
+            <a:r>
+              <a:rPr lang="en-US" sz="1200" b="1" dirty="0" smtClean="0">
+                <a:solidFill>
+                  <a:srgbClr val="00B050"/>
+                </a:solidFill>
+              </a:rPr>
+              <a:t>or more lines (end in CRLF)</a:t>
+            </a:r>
+            <a:endParaRPr lang="en-US" sz="1200" b="1" dirty="0">
+              <a:solidFill>
+                <a:srgbClr val="00B050"/>
+              </a:solidFill>
+            </a:endParaRPr>
+          </a:p>
+        </p:txBody>
+      </p:sp>
+      <p:cxnSp>
+        <p:nvCxnSpPr>
+          <p:cNvPr id="26" name="Curved Connector 25"/>
+          <p:cNvCxnSpPr/>
+          <p:nvPr/>
+        </p:nvCxnSpPr>
+        <p:spPr>
+          <a:xfrm rot="10800000" flipV="1">
+            <a:off x="5366522" y="3657885"/>
+            <a:ext cx="533400" cy="276205"/>
+          </a:xfrm>
+          <a:prstGeom prst="curvedConnector3">
+            <a:avLst/>
+          </a:prstGeom>
+          <a:ln>
+            <a:solidFill>
+              <a:srgbClr val="00B050"/>
+            </a:solidFill>
+            <a:tailEnd type="arrow"/>
+          </a:ln>
+        </p:spPr>
+        <p:style>
+          <a:lnRef idx="1">
+            <a:schemeClr val="accent1"/>
+          </a:lnRef>
+          <a:fillRef idx="0">
+            <a:schemeClr val="accent1"/>
+          </a:fillRef>
+          <a:effectRef idx="0">
+            <a:schemeClr val="accent1"/>
+          </a:effectRef>
+          <a:fontRef idx="minor">
+            <a:schemeClr val="tx1"/>
+          </a:fontRef>
+        </p:style>
+      </p:cxnSp>
+      <p:cxnSp>
+        <p:nvCxnSpPr>
+          <p:cNvPr id="27" name="Curved Connector 26"/>
+          <p:cNvCxnSpPr/>
+          <p:nvPr/>
+        </p:nvCxnSpPr>
+        <p:spPr>
+          <a:xfrm rot="10800000" flipV="1">
+            <a:off x="5389756" y="2843592"/>
+            <a:ext cx="533400" cy="276205"/>
+          </a:xfrm>
+          <a:prstGeom prst="curvedConnector3">
+            <a:avLst/>
+          </a:prstGeom>
+          <a:ln>
+            <a:solidFill>
+              <a:srgbClr val="00B050"/>
+            </a:solidFill>
+            <a:tailEnd type="arrow"/>
+          </a:ln>
+        </p:spPr>
+        <p:style>
+          <a:lnRef idx="1">
+            <a:schemeClr val="accent1"/>
+          </a:lnRef>
+          <a:fillRef idx="0">
+            <a:schemeClr val="accent1"/>
+          </a:fillRef>
+          <a:effectRef idx="0">
+            <a:schemeClr val="accent1"/>
+          </a:effectRef>
+          <a:fontRef idx="minor">
+            <a:schemeClr val="tx1"/>
+          </a:fontRef>
+        </p:style>
+      </p:cxnSp>
     </p:spTree>
     <p:extLst>
       <p:ext uri="{BB962C8B-B14F-4D97-AF65-F5344CB8AC3E}">
@@ -7298,11 +7526,7 @@
             </a:r>
             <a:r>
               <a:rPr lang="en-US" sz="1600" b="1" dirty="0" smtClean="0"/>
-              <a:t>           </a:t>
-            </a:r>
-            <a:r>
-              <a:rPr lang="en-US" sz="1600" b="1" dirty="0" smtClean="0"/>
-              <a:t>= words[ 1 ]</a:t>
+              <a:t>           = words[ 1 ]</a:t>
             </a:r>
           </a:p>
           <a:p>
@@ -7620,15 +7844,7 @@
             </a:r>
             <a:r>
               <a:rPr lang="en-US" sz="1600" b="1" dirty="0" smtClean="0"/>
-              <a:t>) </a:t>
-            </a:r>
-            <a:r>
-              <a:rPr lang="en-US" sz="1600" b="1" dirty="0" smtClean="0"/>
-              <a:t>&lt; </a:t>
-            </a:r>
-            <a:r>
-              <a:rPr lang="en-US" sz="1600" b="1" dirty="0" smtClean="0"/>
-              <a:t>2</a:t>
+              <a:t>) &lt; 2</a:t>
             </a:r>
           </a:p>
           <a:p>
@@ -7692,13 +7908,8 @@
             </a:r>
             <a:r>
               <a:rPr lang="en-US" sz="1600" b="1" dirty="0" smtClean="0"/>
-              <a:t>[ </a:t>
-            </a:r>
-            <a:r>
-              <a:rPr lang="en-US" sz="1600" b="1" dirty="0" smtClean="0"/>
-              <a:t>1 ]</a:t>
-            </a:r>
-            <a:endParaRPr lang="en-US" sz="1600" b="1" dirty="0" smtClean="0"/>
+              <a:t>[ 1 ]</a:t>
+            </a:r>
           </a:p>
           <a:p>
             <a:endParaRPr lang="en-US" sz="1600" b="1" dirty="0"/>
@@ -8544,13 +8755,8 @@
             </a:r>
             <a:r>
               <a:rPr lang="en-US" sz="1600" b="1" dirty="0" smtClean="0"/>
-              <a:t>	</a:t>
-            </a:r>
-            <a:r>
-              <a:rPr lang="en-US" sz="1600" b="1" dirty="0" smtClean="0"/>
-              <a:t>if line is empty</a:t>
-            </a:r>
-            <a:endParaRPr lang="en-US" sz="1600" b="1" dirty="0" smtClean="0"/>
+              <a:t>	if line is empty</a:t>
+            </a:r>
           </a:p>
           <a:p>
             <a:r>
@@ -10969,18 +11175,7 @@
                   </a:schemeClr>
                 </a:solidFill>
               </a:rPr>
-              <a:t>, </a:t>
-            </a:r>
-            <a:r>
-              <a:rPr lang="en-US" sz="1600" b="1" dirty="0" smtClean="0">
-                <a:solidFill>
-                  <a:schemeClr val="tx1">
-                    <a:lumMod val="95000"/>
-                    <a:lumOff val="5000"/>
-                  </a:schemeClr>
-                </a:solidFill>
-              </a:rPr>
-              <a:t>message )</a:t>
+              <a:t>, message )</a:t>
             </a:r>
           </a:p>
           <a:p>
@@ -11902,18 +12097,7 @@
                   </a:schemeClr>
                 </a:solidFill>
               </a:rPr>
-              <a:t>, </a:t>
-            </a:r>
-            <a:r>
-              <a:rPr lang="en-US" sz="1600" b="1" dirty="0" smtClean="0">
-                <a:solidFill>
-                  <a:schemeClr val="tx1">
-                    <a:lumMod val="95000"/>
-                    <a:lumOff val="5000"/>
-                  </a:schemeClr>
-                </a:solidFill>
-              </a:rPr>
-              <a:t>message = </a:t>
+              <a:t>, message = </a:t>
             </a:r>
             <a:r>
               <a:rPr lang="en-US" sz="1600" b="1" dirty="0" err="1" smtClean="0">
@@ -11966,15 +12150,7 @@
                   <a:srgbClr val="00B050"/>
                 </a:solidFill>
               </a:rPr>
-              <a:t># do something with the </a:t>
-            </a:r>
-            <a:r>
-              <a:rPr lang="en-US" sz="1600" b="1" dirty="0" smtClean="0">
-                <a:solidFill>
-                  <a:srgbClr val="00B050"/>
-                </a:solidFill>
-              </a:rPr>
-              <a:t>request (sets status, reason </a:t>
+              <a:t># do something with the request (sets status, reason </a:t>
             </a:r>
             <a:r>
               <a:rPr lang="en-US" sz="1600" b="1" smtClean="0">
@@ -16211,12 +16387,22 @@
           <a:lstStyle/>
           <a:p>
             <a:r>
+              <a:rPr lang="en-US" sz="1200" b="1" u="sng" dirty="0" smtClean="0">
+                <a:solidFill>
+                  <a:schemeClr val="accent1">
+                    <a:lumMod val="75000"/>
+                  </a:schemeClr>
+                </a:solidFill>
+              </a:rPr>
+              <a:t>One</a:t>
+            </a:r>
+            <a:r>
               <a:rPr lang="en-US" sz="1200" b="1" dirty="0" smtClean="0">
                 <a:solidFill>
                   <a:srgbClr val="00B050"/>
                 </a:solidFill>
               </a:rPr>
-              <a:t>One or more lines (end in CRLF)</a:t>
+              <a:t> or more lines (end in CRLF)</a:t>
             </a:r>
             <a:endParaRPr lang="en-US" sz="1200" b="1" dirty="0">
               <a:solidFill>
@@ -17703,15 +17889,7 @@
             </a:r>
             <a:r>
               <a:rPr lang="en-US" sz="1600" b="1" dirty="0" smtClean="0"/>
-              <a:t>	header </a:t>
-            </a:r>
-            <a:r>
-              <a:rPr lang="en-US" sz="1600" b="1" dirty="0" smtClean="0"/>
-              <a:t>+= </a:t>
-            </a:r>
-            <a:r>
-              <a:rPr lang="en-US" sz="1600" b="1" dirty="0" smtClean="0"/>
-              <a:t>key + “:” + value + CRLF</a:t>
+              <a:t>	header += key + “:” + value + CRLF</a:t>
             </a:r>
             <a:br>
               <a:rPr lang="en-US" sz="1600" b="1" dirty="0" smtClean="0"/>

</xml_diff>

<commit_message>
code along for TF
</commit_message>
<xml_diff>
--- a/Presentations/CS - HTTP.pptx
+++ b/Presentations/CS - HTTP.pptx
@@ -3545,8 +3545,8 @@
               <a:rPr lang="en-US" dirty="0" smtClean="0"/>
             </a:br>
             <a:r>
-              <a:rPr lang="en-US" dirty="0" smtClean="0"/>
-              <a:t>Networking Basics</a:t>
+              <a:rPr lang="en-US" smtClean="0"/>
+              <a:t>HTTP Protocol</a:t>
             </a:r>
             <a:endParaRPr lang="en-US" dirty="0"/>
           </a:p>

</xml_diff>